<commit_message>
Added Hands On Demos - Day 18
</commit_message>
<xml_diff>
--- a/4. JavaScript (ES6) & Node.js/Day 16/Slides/12. Security and Building for Production/security-and-building-for-production-slides.pptx
+++ b/4. JavaScript (ES6) & Node.js/Day 16/Slides/12. Security and Building for Production/security-and-building-for-production-slides.pptx
@@ -3820,6 +3820,10 @@
           </p:nvPr>
         </p:nvSpPr>
         <p:spPr>
+          <a:xfrm>
+            <a:off x="1100456" y="1483867"/>
+            <a:ext cx="9991087" cy="4121150"/>
+          </a:xfrm>
           <a:prstGeom prst="rect">
             <a:avLst/>
           </a:prstGeom>
@@ -4117,11 +4121,11 @@
             </a:pPr>
             <a:r>
               <a:rPr spc="25" dirty="0"/>
-              <a:t>/dist</a:t>
-            </a:r>
-            <a:r>
-              <a:rPr spc="-150" dirty="0"/>
-              <a:t> </a:t>
+              <a:t>/</a:t>
+            </a:r>
+            <a:r>
+              <a:rPr lang="en-US" spc="25" dirty="0"/>
+              <a:t>build </a:t>
             </a:r>
             <a:r>
               <a:rPr spc="10" dirty="0"/>

</xml_diff>